<commit_message>
[~] Reordered lectures 4 and 5 [~] Lecture4
</commit_message>
<xml_diff>
--- a/Lectures/6.Vulnerabilities/Lecture6.pptx
+++ b/Lectures/6.Vulnerabilities/Lecture6.pptx
@@ -24,8 +24,8 @@
     <p:sldId id="361" r:id="rId15"/>
     <p:sldId id="360" r:id="rId16"/>
     <p:sldId id="359" r:id="rId17"/>
-    <p:sldId id="408" r:id="rId18"/>
-    <p:sldId id="375" r:id="rId19"/>
+    <p:sldId id="375" r:id="rId18"/>
+    <p:sldId id="408" r:id="rId19"/>
     <p:sldId id="378" r:id="rId20"/>
     <p:sldId id="377" r:id="rId21"/>
     <p:sldId id="379" r:id="rId22"/>
@@ -252,7 +252,7 @@
           <a:p>
             <a:fld id="{8A70136C-4900-4139-A65E-0FFE21BA8660}" type="datetimeFigureOut">
               <a:rPr lang="en-US" smtClean="0"/>
-              <a:t>10/29/2024</a:t>
+              <a:t>10/30/2025</a:t>
             </a:fld>
             <a:endParaRPr lang="en-US"/>
           </a:p>
@@ -9881,7 +9881,7 @@
           <p:cNvPr id="2" name="Заголовок 1">
             <a:extLst>
               <a:ext uri="{FF2B5EF4-FFF2-40B4-BE49-F238E27FC236}">
-                <a16:creationId xmlns:a16="http://schemas.microsoft.com/office/drawing/2014/main" id="{49C608F0-0175-45F0-CDBF-9E985DF01C9B}"/>
+                <a16:creationId xmlns:a16="http://schemas.microsoft.com/office/drawing/2014/main" id="{92DC634E-EDC1-4875-9A06-3D126D1A2E49}"/>
               </a:ext>
             </a:extLst>
           </p:cNvPr>
@@ -9899,30 +9899,47 @@
           <a:p>
             <a:r>
               <a:rPr lang="ru-RU" dirty="0"/>
-              <a:t>Об аргументах и переменных среды </a:t>
-            </a:r>
-            <a:r>
-              <a:rPr lang="ru-RU" sz="2000" dirty="0"/>
-              <a:t>(</a:t>
-            </a:r>
-            <a:r>
-              <a:rPr lang="en-US" sz="2000" dirty="0"/>
-              <a:t>Linux</a:t>
-            </a:r>
-            <a:r>
-              <a:rPr lang="ru-RU" sz="2000" dirty="0"/>
-              <a:t>)</a:t>
-            </a:r>
-            <a:endParaRPr lang="ru-RU" dirty="0"/>
-          </a:p>
-        </p:txBody>
-      </p:sp>
-      <p:sp>
-        <p:nvSpPr>
-          <p:cNvPr id="3" name="Объект 2">
-            <a:extLst>
-              <a:ext uri="{FF2B5EF4-FFF2-40B4-BE49-F238E27FC236}">
-                <a16:creationId xmlns:a16="http://schemas.microsoft.com/office/drawing/2014/main" id="{63498A6F-8B04-8B66-8148-C3237111ECAF}"/>
+              <a:t>Защита от выполнения</a:t>
+            </a:r>
+            <a:endParaRPr lang="en-US" dirty="0"/>
+          </a:p>
+        </p:txBody>
+      </p:sp>
+      <p:sp>
+        <p:nvSpPr>
+          <p:cNvPr id="5" name="Номер слайда 4">
+            <a:extLst>
+              <a:ext uri="{FF2B5EF4-FFF2-40B4-BE49-F238E27FC236}">
+                <a16:creationId xmlns:a16="http://schemas.microsoft.com/office/drawing/2014/main" id="{9DB92496-D89E-46CC-BD94-449C7A865604}"/>
+              </a:ext>
+            </a:extLst>
+          </p:cNvPr>
+          <p:cNvSpPr>
+            <a:spLocks noGrp="1"/>
+          </p:cNvSpPr>
+          <p:nvPr>
+            <p:ph type="sldNum" sz="quarter" idx="12"/>
+          </p:nvPr>
+        </p:nvSpPr>
+        <p:spPr/>
+        <p:txBody>
+          <a:bodyPr/>
+          <a:lstStyle/>
+          <a:p>
+            <a:fld id="{B67FBA2B-964F-4C4D-AAF7-5A8399264638}" type="slidenum">
+              <a:rPr lang="en-US" smtClean="0"/>
+              <a:t>17</a:t>
+            </a:fld>
+            <a:endParaRPr lang="en-US" dirty="0"/>
+          </a:p>
+        </p:txBody>
+      </p:sp>
+      <p:sp>
+        <p:nvSpPr>
+          <p:cNvPr id="22" name="Объект 2">
+            <a:extLst>
+              <a:ext uri="{FF2B5EF4-FFF2-40B4-BE49-F238E27FC236}">
+                <a16:creationId xmlns:a16="http://schemas.microsoft.com/office/drawing/2014/main" id="{BFA1C83E-1D14-405D-838A-CA36A32BE11F}"/>
               </a:ext>
             </a:extLst>
           </p:cNvPr>
@@ -9933,7 +9950,12 @@
             <p:ph idx="1"/>
           </p:nvPr>
         </p:nvSpPr>
-        <p:spPr/>
+        <p:spPr>
+          <a:xfrm>
+            <a:off x="838200" y="1825624"/>
+            <a:ext cx="6314440" cy="4530725"/>
+          </a:xfrm>
+        </p:spPr>
         <p:txBody>
           <a:bodyPr>
             <a:normAutofit/>
@@ -9945,23 +9967,7 @@
             </a:pPr>
             <a:r>
               <a:rPr lang="ru-RU" sz="2000" dirty="0"/>
-              <a:t>В ОС на ядре </a:t>
-            </a:r>
-            <a:r>
-              <a:rPr lang="en-US" sz="2000" dirty="0"/>
-              <a:t>Linux </a:t>
-            </a:r>
-            <a:r>
-              <a:rPr lang="ru-RU" sz="2000" dirty="0"/>
-              <a:t>аргументы и переменные среды располагаются в начальной области стека – </a:t>
-            </a:r>
-            <a:r>
-              <a:rPr lang="ru-RU" sz="2000" i="1" dirty="0"/>
-              <a:t>даже если программа их не использует</a:t>
-            </a:r>
-            <a:r>
-              <a:rPr lang="ru-RU" sz="2000" dirty="0"/>
-              <a:t>.</a:t>
+              <a:t>В современных процессорах возможно запрещать исполнение кода в определённых сегментах памяти.</a:t>
             </a:r>
           </a:p>
           <a:p>
@@ -9970,7 +9976,31 @@
             </a:pPr>
             <a:r>
               <a:rPr lang="ru-RU" sz="2000" dirty="0"/>
-              <a:t>Как следствие, аргументы программы и переменные среды могут использоваться, как вспомогательный канал ввода информации, которая используется при успешной эксплуатации других уязвимостей. Например, если буфер слишком мал для шелл-кода, его можно ввести с помощью аргументов программы.</a:t>
+              <a:t>При попытке исполнения кода внутри сегментов </a:t>
+            </a:r>
+            <a:r>
+              <a:rPr lang="en-US" sz="2000" dirty="0"/>
+              <a:t>.stack, .heap, .data, .</a:t>
+            </a:r>
+            <a:r>
+              <a:rPr lang="en-US" sz="2000" dirty="0" err="1"/>
+              <a:t>rodata</a:t>
+            </a:r>
+            <a:r>
+              <a:rPr lang="en-US" sz="2000" dirty="0"/>
+              <a:t> </a:t>
+            </a:r>
+            <a:r>
+              <a:rPr lang="ru-RU" sz="2000" dirty="0"/>
+              <a:t>будет сгенерировано аппаратное исключение и </a:t>
+            </a:r>
+            <a:r>
+              <a:rPr lang="ru-RU" sz="2000" i="1" dirty="0"/>
+              <a:t>программа завершится</a:t>
+            </a:r>
+            <a:r>
+              <a:rPr lang="ru-RU" sz="2000" dirty="0"/>
+              <a:t>.</a:t>
             </a:r>
           </a:p>
           <a:p>
@@ -9979,46 +10009,397 @@
             </a:pPr>
             <a:r>
               <a:rPr lang="ru-RU" sz="2000" dirty="0"/>
-              <a:t>Аргументы удобны тем, что позволяют передавать в программу нулевые байты (пустая строка в качестве аргумента = байт 0). При обычном текстовом вводе-выводе передать в программу последовательность нулевых байтов не всегда возможно, что порождает проблему (например, если вводимый адрес содержит 0, что почти всегда верно для х86-64).</a:t>
-            </a:r>
-          </a:p>
-          <a:p>
-            <a:pPr marL="0" indent="0">
-              <a:buNone/>
-            </a:pPr>
-            <a:r>
+              <a:t>Можно сделать стек исполняемым – но пользователь должен явно запросить это при сборке программы.</a:t>
+            </a:r>
+            <a:br>
               <a:rPr lang="ru-RU" sz="2000" dirty="0"/>
-              <a:t>Обратной стороной такого подхода является смещение адресов элементов стека при изменении аргументов/переменных среды, что неудобно для атакующего.</a:t>
-            </a:r>
-          </a:p>
-        </p:txBody>
-      </p:sp>
-      <p:sp>
-        <p:nvSpPr>
-          <p:cNvPr id="5" name="Номер слайда 4">
-            <a:extLst>
-              <a:ext uri="{FF2B5EF4-FFF2-40B4-BE49-F238E27FC236}">
-                <a16:creationId xmlns:a16="http://schemas.microsoft.com/office/drawing/2014/main" id="{691A847E-7434-C7B9-D165-900E85A8DDAB}"/>
-              </a:ext>
-            </a:extLst>
-          </p:cNvPr>
-          <p:cNvSpPr>
-            <a:spLocks noGrp="1"/>
-          </p:cNvSpPr>
-          <p:nvPr>
-            <p:ph type="sldNum" sz="quarter" idx="12"/>
-          </p:nvPr>
-        </p:nvSpPr>
-        <p:spPr/>
-        <p:txBody>
-          <a:bodyPr/>
-          <a:lstStyle/>
-          <a:p>
-            <a:fld id="{B67FBA2B-964F-4C4D-AAF7-5A8399264638}" type="slidenum">
-              <a:rPr lang="en-US" smtClean="0"/>
-              <a:pPr/>
-              <a:t>17</a:t>
-            </a:fld>
+            </a:br>
+            <a:endParaRPr lang="en-US" sz="2000" dirty="0"/>
+          </a:p>
+        </p:txBody>
+      </p:sp>
+      <p:sp>
+        <p:nvSpPr>
+          <p:cNvPr id="6" name="Прямоугольник 5">
+            <a:extLst>
+              <a:ext uri="{FF2B5EF4-FFF2-40B4-BE49-F238E27FC236}">
+                <a16:creationId xmlns:a16="http://schemas.microsoft.com/office/drawing/2014/main" id="{2093F97A-DDB2-4FAE-BA6D-65B458A299BC}"/>
+              </a:ext>
+            </a:extLst>
+          </p:cNvPr>
+          <p:cNvSpPr/>
+          <p:nvPr/>
+        </p:nvSpPr>
+        <p:spPr>
+          <a:xfrm>
+            <a:off x="8933992" y="1690688"/>
+            <a:ext cx="2396971" cy="4101484"/>
+          </a:xfrm>
+          <a:prstGeom prst="rect">
+            <a:avLst/>
+          </a:prstGeom>
+          <a:noFill/>
+          <a:ln>
+            <a:solidFill>
+              <a:schemeClr val="tx1"/>
+            </a:solidFill>
+          </a:ln>
+        </p:spPr>
+        <p:style>
+          <a:lnRef idx="2">
+            <a:schemeClr val="accent1">
+              <a:shade val="50000"/>
+            </a:schemeClr>
+          </a:lnRef>
+          <a:fillRef idx="1">
+            <a:schemeClr val="accent1"/>
+          </a:fillRef>
+          <a:effectRef idx="0">
+            <a:schemeClr val="accent1"/>
+          </a:effectRef>
+          <a:fontRef idx="minor">
+            <a:schemeClr val="lt1"/>
+          </a:fontRef>
+        </p:style>
+        <p:txBody>
+          <a:bodyPr rtlCol="0" anchor="ctr"/>
+          <a:lstStyle/>
+          <a:p>
+            <a:pPr algn="ctr"/>
+            <a:endParaRPr lang="en-US"/>
+          </a:p>
+        </p:txBody>
+      </p:sp>
+      <p:sp>
+        <p:nvSpPr>
+          <p:cNvPr id="7" name="Прямоугольник 6">
+            <a:extLst>
+              <a:ext uri="{FF2B5EF4-FFF2-40B4-BE49-F238E27FC236}">
+                <a16:creationId xmlns:a16="http://schemas.microsoft.com/office/drawing/2014/main" id="{099604AA-3FCC-4188-BE64-2E99EB6D91BD}"/>
+              </a:ext>
+            </a:extLst>
+          </p:cNvPr>
+          <p:cNvSpPr/>
+          <p:nvPr/>
+        </p:nvSpPr>
+        <p:spPr>
+          <a:xfrm>
+            <a:off x="8933992" y="1684917"/>
+            <a:ext cx="2396971" cy="368419"/>
+          </a:xfrm>
+          <a:prstGeom prst="rect">
+            <a:avLst/>
+          </a:prstGeom>
+          <a:solidFill>
+            <a:schemeClr val="accent2">
+              <a:lumMod val="75000"/>
+            </a:schemeClr>
+          </a:solidFill>
+          <a:ln>
+            <a:solidFill>
+              <a:schemeClr val="tx1"/>
+            </a:solidFill>
+          </a:ln>
+        </p:spPr>
+        <p:style>
+          <a:lnRef idx="2">
+            <a:schemeClr val="accent1">
+              <a:shade val="50000"/>
+            </a:schemeClr>
+          </a:lnRef>
+          <a:fillRef idx="1">
+            <a:schemeClr val="accent1"/>
+          </a:fillRef>
+          <a:effectRef idx="0">
+            <a:schemeClr val="accent1"/>
+          </a:effectRef>
+          <a:fontRef idx="minor">
+            <a:schemeClr val="lt1"/>
+          </a:fontRef>
+        </p:style>
+        <p:txBody>
+          <a:bodyPr rtlCol="0" anchor="ctr"/>
+          <a:lstStyle/>
+          <a:p>
+            <a:pPr algn="ctr"/>
+            <a:r>
+              <a:rPr lang="en-US" dirty="0">
+                <a:solidFill>
+                  <a:schemeClr val="tx1"/>
+                </a:solidFill>
+              </a:rPr>
+              <a:t>new return address</a:t>
+            </a:r>
+          </a:p>
+        </p:txBody>
+      </p:sp>
+      <p:sp>
+        <p:nvSpPr>
+          <p:cNvPr id="8" name="Прямоугольник 7">
+            <a:extLst>
+              <a:ext uri="{FF2B5EF4-FFF2-40B4-BE49-F238E27FC236}">
+                <a16:creationId xmlns:a16="http://schemas.microsoft.com/office/drawing/2014/main" id="{93121384-1C22-4666-8464-F7633FC544B0}"/>
+              </a:ext>
+            </a:extLst>
+          </p:cNvPr>
+          <p:cNvSpPr/>
+          <p:nvPr/>
+        </p:nvSpPr>
+        <p:spPr>
+          <a:xfrm>
+            <a:off x="8933992" y="2434647"/>
+            <a:ext cx="2396971" cy="1616308"/>
+          </a:xfrm>
+          <a:prstGeom prst="rect">
+            <a:avLst/>
+          </a:prstGeom>
+          <a:solidFill>
+            <a:schemeClr val="accent6">
+              <a:lumMod val="60000"/>
+              <a:lumOff val="40000"/>
+            </a:schemeClr>
+          </a:solidFill>
+          <a:ln>
+            <a:solidFill>
+              <a:schemeClr val="tx1"/>
+            </a:solidFill>
+          </a:ln>
+        </p:spPr>
+        <p:style>
+          <a:lnRef idx="2">
+            <a:schemeClr val="accent1">
+              <a:shade val="50000"/>
+            </a:schemeClr>
+          </a:lnRef>
+          <a:fillRef idx="1">
+            <a:schemeClr val="accent1"/>
+          </a:fillRef>
+          <a:effectRef idx="0">
+            <a:schemeClr val="accent1"/>
+          </a:effectRef>
+          <a:fontRef idx="minor">
+            <a:schemeClr val="lt1"/>
+          </a:fontRef>
+        </p:style>
+        <p:txBody>
+          <a:bodyPr rtlCol="0" anchor="ctr"/>
+          <a:lstStyle/>
+          <a:p>
+            <a:pPr algn="ctr"/>
+            <a:r>
+              <a:rPr lang="en-US" dirty="0">
+                <a:solidFill>
+                  <a:schemeClr val="tx1"/>
+                </a:solidFill>
+              </a:rPr>
+              <a:t>Your code</a:t>
+            </a:r>
+          </a:p>
+        </p:txBody>
+      </p:sp>
+      <p:sp>
+        <p:nvSpPr>
+          <p:cNvPr id="9" name="Прямоугольник 8">
+            <a:extLst>
+              <a:ext uri="{FF2B5EF4-FFF2-40B4-BE49-F238E27FC236}">
+                <a16:creationId xmlns:a16="http://schemas.microsoft.com/office/drawing/2014/main" id="{AFD0483F-B3D3-40C4-B059-2AE2592B10BE}"/>
+              </a:ext>
+            </a:extLst>
+          </p:cNvPr>
+          <p:cNvSpPr/>
+          <p:nvPr/>
+        </p:nvSpPr>
+        <p:spPr>
+          <a:xfrm>
+            <a:off x="8933992" y="2061077"/>
+            <a:ext cx="2396971" cy="368419"/>
+          </a:xfrm>
+          <a:prstGeom prst="rect">
+            <a:avLst/>
+          </a:prstGeom>
+          <a:solidFill>
+            <a:schemeClr val="accent2">
+              <a:lumMod val="75000"/>
+            </a:schemeClr>
+          </a:solidFill>
+          <a:ln>
+            <a:solidFill>
+              <a:schemeClr val="tx1"/>
+            </a:solidFill>
+          </a:ln>
+        </p:spPr>
+        <p:style>
+          <a:lnRef idx="2">
+            <a:schemeClr val="accent1">
+              <a:shade val="50000"/>
+            </a:schemeClr>
+          </a:lnRef>
+          <a:fillRef idx="1">
+            <a:schemeClr val="accent1"/>
+          </a:fillRef>
+          <a:effectRef idx="0">
+            <a:schemeClr val="accent1"/>
+          </a:effectRef>
+          <a:fontRef idx="minor">
+            <a:schemeClr val="lt1"/>
+          </a:fontRef>
+        </p:style>
+        <p:txBody>
+          <a:bodyPr rtlCol="0" anchor="ctr"/>
+          <a:lstStyle/>
+          <a:p>
+            <a:pPr algn="ctr"/>
+            <a:r>
+              <a:rPr lang="en-US" dirty="0">
+                <a:solidFill>
+                  <a:schemeClr val="tx1"/>
+                </a:solidFill>
+              </a:rPr>
+              <a:t>0x31 </a:t>
+            </a:r>
+            <a:r>
+              <a:rPr lang="en-US" dirty="0" err="1">
+                <a:solidFill>
+                  <a:schemeClr val="tx1"/>
+                </a:solidFill>
+              </a:rPr>
+              <a:t>0x31</a:t>
+            </a:r>
+            <a:r>
+              <a:rPr lang="en-US" dirty="0">
+                <a:solidFill>
+                  <a:schemeClr val="tx1"/>
+                </a:solidFill>
+              </a:rPr>
+              <a:t> </a:t>
+            </a:r>
+            <a:r>
+              <a:rPr lang="en-US" dirty="0" err="1">
+                <a:solidFill>
+                  <a:schemeClr val="tx1"/>
+                </a:solidFill>
+              </a:rPr>
+              <a:t>0x31</a:t>
+            </a:r>
+            <a:r>
+              <a:rPr lang="en-US" dirty="0">
+                <a:solidFill>
+                  <a:schemeClr val="tx1"/>
+                </a:solidFill>
+              </a:rPr>
+              <a:t> </a:t>
+            </a:r>
+            <a:r>
+              <a:rPr lang="en-US" dirty="0" err="1">
+                <a:solidFill>
+                  <a:schemeClr val="tx1"/>
+                </a:solidFill>
+              </a:rPr>
+              <a:t>0x31</a:t>
+            </a:r>
+            <a:endParaRPr lang="en-US" dirty="0">
+              <a:solidFill>
+                <a:schemeClr val="tx1"/>
+              </a:solidFill>
+            </a:endParaRPr>
+          </a:p>
+        </p:txBody>
+      </p:sp>
+      <p:cxnSp>
+        <p:nvCxnSpPr>
+          <p:cNvPr id="10" name="Соединитель: уступ 9">
+            <a:extLst>
+              <a:ext uri="{FF2B5EF4-FFF2-40B4-BE49-F238E27FC236}">
+                <a16:creationId xmlns:a16="http://schemas.microsoft.com/office/drawing/2014/main" id="{669527EA-435B-4319-9E26-0C671C0B274D}"/>
+              </a:ext>
+            </a:extLst>
+          </p:cNvPr>
+          <p:cNvCxnSpPr>
+            <a:cxnSpLocks/>
+            <a:stCxn id="7" idx="1"/>
+          </p:cNvCxnSpPr>
+          <p:nvPr/>
+        </p:nvCxnSpPr>
+        <p:spPr>
+          <a:xfrm rot="10800000" flipH="1" flipV="1">
+            <a:off x="8933992" y="1869127"/>
+            <a:ext cx="12700" cy="2181828"/>
+          </a:xfrm>
+          <a:prstGeom prst="bentConnector4">
+            <a:avLst>
+              <a:gd name="adj1" fmla="val -1800000"/>
+              <a:gd name="adj2" fmla="val 99980"/>
+            </a:avLst>
+          </a:prstGeom>
+          <a:ln w="19050">
+            <a:solidFill>
+              <a:schemeClr val="accent2">
+                <a:lumMod val="75000"/>
+              </a:schemeClr>
+            </a:solidFill>
+            <a:tailEnd type="triangle"/>
+          </a:ln>
+        </p:spPr>
+        <p:style>
+          <a:lnRef idx="1">
+            <a:schemeClr val="accent1"/>
+          </a:lnRef>
+          <a:fillRef idx="0">
+            <a:schemeClr val="accent1"/>
+          </a:fillRef>
+          <a:effectRef idx="0">
+            <a:schemeClr val="accent1"/>
+          </a:effectRef>
+          <a:fontRef idx="minor">
+            <a:schemeClr val="tx1"/>
+          </a:fontRef>
+        </p:style>
+      </p:cxnSp>
+      <p:sp>
+        <p:nvSpPr>
+          <p:cNvPr id="11" name="Знак умножения 10">
+            <a:extLst>
+              <a:ext uri="{FF2B5EF4-FFF2-40B4-BE49-F238E27FC236}">
+                <a16:creationId xmlns:a16="http://schemas.microsoft.com/office/drawing/2014/main" id="{DEAFE425-CABE-4D81-891E-26348DDBDCF0}"/>
+              </a:ext>
+            </a:extLst>
+          </p:cNvPr>
+          <p:cNvSpPr/>
+          <p:nvPr/>
+        </p:nvSpPr>
+        <p:spPr>
+          <a:xfrm>
+            <a:off x="8375670" y="2617514"/>
+            <a:ext cx="656363" cy="405326"/>
+          </a:xfrm>
+          <a:prstGeom prst="mathMultiply">
+            <a:avLst/>
+          </a:prstGeom>
+          <a:solidFill>
+            <a:srgbClr val="FF0000"/>
+          </a:solidFill>
+        </p:spPr>
+        <p:style>
+          <a:lnRef idx="2">
+            <a:schemeClr val="accent1">
+              <a:shade val="50000"/>
+            </a:schemeClr>
+          </a:lnRef>
+          <a:fillRef idx="1">
+            <a:schemeClr val="accent1"/>
+          </a:fillRef>
+          <a:effectRef idx="0">
+            <a:schemeClr val="accent1"/>
+          </a:effectRef>
+          <a:fontRef idx="minor">
+            <a:schemeClr val="lt1"/>
+          </a:fontRef>
+        </p:style>
+        <p:txBody>
+          <a:bodyPr rtlCol="0" anchor="ctr"/>
+          <a:lstStyle/>
+          <a:p>
+            <a:pPr algn="ctr"/>
             <a:endParaRPr lang="en-US"/>
           </a:p>
         </p:txBody>
@@ -10026,7 +10407,7 @@
     </p:spTree>
     <p:extLst>
       <p:ext uri="{BB962C8B-B14F-4D97-AF65-F5344CB8AC3E}">
-        <p14:creationId xmlns:p14="http://schemas.microsoft.com/office/powerpoint/2010/main" val="173719792"/>
+        <p14:creationId xmlns:p14="http://schemas.microsoft.com/office/powerpoint/2010/main" val="2824373434"/>
       </p:ext>
     </p:extLst>
   </p:cSld>
@@ -10058,7 +10439,7 @@
           <p:cNvPr id="2" name="Заголовок 1">
             <a:extLst>
               <a:ext uri="{FF2B5EF4-FFF2-40B4-BE49-F238E27FC236}">
-                <a16:creationId xmlns:a16="http://schemas.microsoft.com/office/drawing/2014/main" id="{92DC634E-EDC1-4875-9A06-3D126D1A2E49}"/>
+                <a16:creationId xmlns:a16="http://schemas.microsoft.com/office/drawing/2014/main" id="{49C608F0-0175-45F0-CDBF-9E985DF01C9B}"/>
               </a:ext>
             </a:extLst>
           </p:cNvPr>
@@ -10076,9 +10457,97 @@
           <a:p>
             <a:r>
               <a:rPr lang="ru-RU" dirty="0"/>
-              <a:t>Защита от выполнения</a:t>
-            </a:r>
-            <a:endParaRPr lang="en-US" dirty="0"/>
+              <a:t>Об аргументах и переменных среды </a:t>
+            </a:r>
+            <a:r>
+              <a:rPr lang="ru-RU" sz="2000" dirty="0"/>
+              <a:t>(</a:t>
+            </a:r>
+            <a:r>
+              <a:rPr lang="en-US" sz="2000" dirty="0"/>
+              <a:t>Linux</a:t>
+            </a:r>
+            <a:r>
+              <a:rPr lang="ru-RU" sz="2000" dirty="0"/>
+              <a:t>)</a:t>
+            </a:r>
+            <a:endParaRPr lang="ru-RU" dirty="0"/>
+          </a:p>
+        </p:txBody>
+      </p:sp>
+      <p:sp>
+        <p:nvSpPr>
+          <p:cNvPr id="3" name="Объект 2">
+            <a:extLst>
+              <a:ext uri="{FF2B5EF4-FFF2-40B4-BE49-F238E27FC236}">
+                <a16:creationId xmlns:a16="http://schemas.microsoft.com/office/drawing/2014/main" id="{63498A6F-8B04-8B66-8148-C3237111ECAF}"/>
+              </a:ext>
+            </a:extLst>
+          </p:cNvPr>
+          <p:cNvSpPr>
+            <a:spLocks noGrp="1"/>
+          </p:cNvSpPr>
+          <p:nvPr>
+            <p:ph idx="1"/>
+          </p:nvPr>
+        </p:nvSpPr>
+        <p:spPr/>
+        <p:txBody>
+          <a:bodyPr>
+            <a:normAutofit/>
+          </a:bodyPr>
+          <a:lstStyle/>
+          <a:p>
+            <a:pPr marL="0" indent="0">
+              <a:buNone/>
+            </a:pPr>
+            <a:r>
+              <a:rPr lang="ru-RU" sz="2000" dirty="0"/>
+              <a:t>В ОС на ядре </a:t>
+            </a:r>
+            <a:r>
+              <a:rPr lang="en-US" sz="2000" dirty="0"/>
+              <a:t>Linux </a:t>
+            </a:r>
+            <a:r>
+              <a:rPr lang="ru-RU" sz="2000" dirty="0"/>
+              <a:t>аргументы и переменные среды располагаются в начальной области стека – </a:t>
+            </a:r>
+            <a:r>
+              <a:rPr lang="ru-RU" sz="2000" i="1" dirty="0"/>
+              <a:t>даже если программа их не использует</a:t>
+            </a:r>
+            <a:r>
+              <a:rPr lang="ru-RU" sz="2000" dirty="0"/>
+              <a:t>.</a:t>
+            </a:r>
+          </a:p>
+          <a:p>
+            <a:pPr marL="0" indent="0">
+              <a:buNone/>
+            </a:pPr>
+            <a:r>
+              <a:rPr lang="ru-RU" sz="2000" dirty="0"/>
+              <a:t>Как следствие, аргументы программы и переменные среды могут использоваться, как вспомогательный канал ввода информации, которая используется при успешной эксплуатации других уязвимостей. Например, если буфер слишком мал для шелл-кода, его можно ввести с помощью аргументов программы.</a:t>
+            </a:r>
+          </a:p>
+          <a:p>
+            <a:pPr marL="0" indent="0">
+              <a:buNone/>
+            </a:pPr>
+            <a:r>
+              <a:rPr lang="ru-RU" sz="2000" dirty="0"/>
+              <a:t>Аргументы удобны тем, что позволяют передавать в программу нулевые байты (пустая строка в качестве аргумента = байт 0). При обычном текстовом вводе-выводе передать в программу последовательность нулевых байтов не всегда возможно, что порождает проблему (например, если вводимый адрес содержит 0, что почти всегда верно для х86-64).</a:t>
+            </a:r>
+          </a:p>
+          <a:p>
+            <a:pPr marL="0" indent="0">
+              <a:buNone/>
+            </a:pPr>
+            <a:r>
+              <a:rPr lang="ru-RU" sz="2000" dirty="0"/>
+              <a:t>Обратной стороной такого подхода является смещение адресов элементов стека при изменении аргументов/переменных среды, что неудобно для атакующего.</a:t>
+            </a:r>
           </a:p>
         </p:txBody>
       </p:sp>
@@ -10087,7 +10556,7 @@
           <p:cNvPr id="5" name="Номер слайда 4">
             <a:extLst>
               <a:ext uri="{FF2B5EF4-FFF2-40B4-BE49-F238E27FC236}">
-                <a16:creationId xmlns:a16="http://schemas.microsoft.com/office/drawing/2014/main" id="{9DB92496-D89E-46CC-BD94-449C7A865604}"/>
+                <a16:creationId xmlns:a16="http://schemas.microsoft.com/office/drawing/2014/main" id="{691A847E-7434-C7B9-D165-900E85A8DDAB}"/>
               </a:ext>
             </a:extLst>
           </p:cNvPr>
@@ -10105,478 +10574,9 @@
           <a:p>
             <a:fld id="{B67FBA2B-964F-4C4D-AAF7-5A8399264638}" type="slidenum">
               <a:rPr lang="en-US" smtClean="0"/>
+              <a:pPr/>
               <a:t>18</a:t>
             </a:fld>
-            <a:endParaRPr lang="en-US" dirty="0"/>
-          </a:p>
-        </p:txBody>
-      </p:sp>
-      <p:sp>
-        <p:nvSpPr>
-          <p:cNvPr id="22" name="Объект 2">
-            <a:extLst>
-              <a:ext uri="{FF2B5EF4-FFF2-40B4-BE49-F238E27FC236}">
-                <a16:creationId xmlns:a16="http://schemas.microsoft.com/office/drawing/2014/main" id="{BFA1C83E-1D14-405D-838A-CA36A32BE11F}"/>
-              </a:ext>
-            </a:extLst>
-          </p:cNvPr>
-          <p:cNvSpPr>
-            <a:spLocks noGrp="1"/>
-          </p:cNvSpPr>
-          <p:nvPr>
-            <p:ph idx="1"/>
-          </p:nvPr>
-        </p:nvSpPr>
-        <p:spPr>
-          <a:xfrm>
-            <a:off x="838200" y="1825624"/>
-            <a:ext cx="6314440" cy="4530725"/>
-          </a:xfrm>
-        </p:spPr>
-        <p:txBody>
-          <a:bodyPr>
-            <a:normAutofit/>
-          </a:bodyPr>
-          <a:lstStyle/>
-          <a:p>
-            <a:pPr marL="0" indent="0">
-              <a:buNone/>
-            </a:pPr>
-            <a:r>
-              <a:rPr lang="ru-RU" sz="2000" dirty="0"/>
-              <a:t>В современных процессорах возможно запрещать исполнение кода в определённых сегментах памяти.</a:t>
-            </a:r>
-          </a:p>
-          <a:p>
-            <a:pPr marL="0" indent="0">
-              <a:buNone/>
-            </a:pPr>
-            <a:r>
-              <a:rPr lang="ru-RU" sz="2000" dirty="0"/>
-              <a:t>При попытке исполнения кода внутри сегментов </a:t>
-            </a:r>
-            <a:r>
-              <a:rPr lang="en-US" sz="2000" dirty="0"/>
-              <a:t>.stack, .heap, .data, .</a:t>
-            </a:r>
-            <a:r>
-              <a:rPr lang="en-US" sz="2000" dirty="0" err="1"/>
-              <a:t>rodata</a:t>
-            </a:r>
-            <a:r>
-              <a:rPr lang="en-US" sz="2000" dirty="0"/>
-              <a:t> </a:t>
-            </a:r>
-            <a:r>
-              <a:rPr lang="ru-RU" sz="2000" dirty="0"/>
-              <a:t>будет сгенерировано аппаратное исключение и </a:t>
-            </a:r>
-            <a:r>
-              <a:rPr lang="ru-RU" sz="2000" i="1" dirty="0"/>
-              <a:t>программа завершится</a:t>
-            </a:r>
-            <a:r>
-              <a:rPr lang="ru-RU" sz="2000" dirty="0"/>
-              <a:t>.</a:t>
-            </a:r>
-          </a:p>
-          <a:p>
-            <a:pPr marL="0" indent="0">
-              <a:buNone/>
-            </a:pPr>
-            <a:r>
-              <a:rPr lang="ru-RU" sz="2000" dirty="0"/>
-              <a:t>Можно сделать стек исполняемым – но пользователь должен явно запросить это при сборке программы.</a:t>
-            </a:r>
-            <a:br>
-              <a:rPr lang="ru-RU" sz="2000" dirty="0"/>
-            </a:br>
-            <a:endParaRPr lang="en-US" sz="2000" dirty="0"/>
-          </a:p>
-        </p:txBody>
-      </p:sp>
-      <p:sp>
-        <p:nvSpPr>
-          <p:cNvPr id="6" name="Прямоугольник 5">
-            <a:extLst>
-              <a:ext uri="{FF2B5EF4-FFF2-40B4-BE49-F238E27FC236}">
-                <a16:creationId xmlns:a16="http://schemas.microsoft.com/office/drawing/2014/main" id="{2093F97A-DDB2-4FAE-BA6D-65B458A299BC}"/>
-              </a:ext>
-            </a:extLst>
-          </p:cNvPr>
-          <p:cNvSpPr/>
-          <p:nvPr/>
-        </p:nvSpPr>
-        <p:spPr>
-          <a:xfrm>
-            <a:off x="8933992" y="1690688"/>
-            <a:ext cx="2396971" cy="4101484"/>
-          </a:xfrm>
-          <a:prstGeom prst="rect">
-            <a:avLst/>
-          </a:prstGeom>
-          <a:noFill/>
-          <a:ln>
-            <a:solidFill>
-              <a:schemeClr val="tx1"/>
-            </a:solidFill>
-          </a:ln>
-        </p:spPr>
-        <p:style>
-          <a:lnRef idx="2">
-            <a:schemeClr val="accent1">
-              <a:shade val="50000"/>
-            </a:schemeClr>
-          </a:lnRef>
-          <a:fillRef idx="1">
-            <a:schemeClr val="accent1"/>
-          </a:fillRef>
-          <a:effectRef idx="0">
-            <a:schemeClr val="accent1"/>
-          </a:effectRef>
-          <a:fontRef idx="minor">
-            <a:schemeClr val="lt1"/>
-          </a:fontRef>
-        </p:style>
-        <p:txBody>
-          <a:bodyPr rtlCol="0" anchor="ctr"/>
-          <a:lstStyle/>
-          <a:p>
-            <a:pPr algn="ctr"/>
-            <a:endParaRPr lang="en-US"/>
-          </a:p>
-        </p:txBody>
-      </p:sp>
-      <p:sp>
-        <p:nvSpPr>
-          <p:cNvPr id="7" name="Прямоугольник 6">
-            <a:extLst>
-              <a:ext uri="{FF2B5EF4-FFF2-40B4-BE49-F238E27FC236}">
-                <a16:creationId xmlns:a16="http://schemas.microsoft.com/office/drawing/2014/main" id="{099604AA-3FCC-4188-BE64-2E99EB6D91BD}"/>
-              </a:ext>
-            </a:extLst>
-          </p:cNvPr>
-          <p:cNvSpPr/>
-          <p:nvPr/>
-        </p:nvSpPr>
-        <p:spPr>
-          <a:xfrm>
-            <a:off x="8933992" y="1684917"/>
-            <a:ext cx="2396971" cy="368419"/>
-          </a:xfrm>
-          <a:prstGeom prst="rect">
-            <a:avLst/>
-          </a:prstGeom>
-          <a:solidFill>
-            <a:schemeClr val="accent2">
-              <a:lumMod val="75000"/>
-            </a:schemeClr>
-          </a:solidFill>
-          <a:ln>
-            <a:solidFill>
-              <a:schemeClr val="tx1"/>
-            </a:solidFill>
-          </a:ln>
-        </p:spPr>
-        <p:style>
-          <a:lnRef idx="2">
-            <a:schemeClr val="accent1">
-              <a:shade val="50000"/>
-            </a:schemeClr>
-          </a:lnRef>
-          <a:fillRef idx="1">
-            <a:schemeClr val="accent1"/>
-          </a:fillRef>
-          <a:effectRef idx="0">
-            <a:schemeClr val="accent1"/>
-          </a:effectRef>
-          <a:fontRef idx="minor">
-            <a:schemeClr val="lt1"/>
-          </a:fontRef>
-        </p:style>
-        <p:txBody>
-          <a:bodyPr rtlCol="0" anchor="ctr"/>
-          <a:lstStyle/>
-          <a:p>
-            <a:pPr algn="ctr"/>
-            <a:r>
-              <a:rPr lang="en-US" dirty="0">
-                <a:solidFill>
-                  <a:schemeClr val="tx1"/>
-                </a:solidFill>
-              </a:rPr>
-              <a:t>new return address</a:t>
-            </a:r>
-          </a:p>
-        </p:txBody>
-      </p:sp>
-      <p:sp>
-        <p:nvSpPr>
-          <p:cNvPr id="8" name="Прямоугольник 7">
-            <a:extLst>
-              <a:ext uri="{FF2B5EF4-FFF2-40B4-BE49-F238E27FC236}">
-                <a16:creationId xmlns:a16="http://schemas.microsoft.com/office/drawing/2014/main" id="{93121384-1C22-4666-8464-F7633FC544B0}"/>
-              </a:ext>
-            </a:extLst>
-          </p:cNvPr>
-          <p:cNvSpPr/>
-          <p:nvPr/>
-        </p:nvSpPr>
-        <p:spPr>
-          <a:xfrm>
-            <a:off x="8933992" y="2434647"/>
-            <a:ext cx="2396971" cy="1616308"/>
-          </a:xfrm>
-          <a:prstGeom prst="rect">
-            <a:avLst/>
-          </a:prstGeom>
-          <a:solidFill>
-            <a:schemeClr val="accent6">
-              <a:lumMod val="60000"/>
-              <a:lumOff val="40000"/>
-            </a:schemeClr>
-          </a:solidFill>
-          <a:ln>
-            <a:solidFill>
-              <a:schemeClr val="tx1"/>
-            </a:solidFill>
-          </a:ln>
-        </p:spPr>
-        <p:style>
-          <a:lnRef idx="2">
-            <a:schemeClr val="accent1">
-              <a:shade val="50000"/>
-            </a:schemeClr>
-          </a:lnRef>
-          <a:fillRef idx="1">
-            <a:schemeClr val="accent1"/>
-          </a:fillRef>
-          <a:effectRef idx="0">
-            <a:schemeClr val="accent1"/>
-          </a:effectRef>
-          <a:fontRef idx="minor">
-            <a:schemeClr val="lt1"/>
-          </a:fontRef>
-        </p:style>
-        <p:txBody>
-          <a:bodyPr rtlCol="0" anchor="ctr"/>
-          <a:lstStyle/>
-          <a:p>
-            <a:pPr algn="ctr"/>
-            <a:r>
-              <a:rPr lang="en-US" dirty="0">
-                <a:solidFill>
-                  <a:schemeClr val="tx1"/>
-                </a:solidFill>
-              </a:rPr>
-              <a:t>Your code</a:t>
-            </a:r>
-          </a:p>
-        </p:txBody>
-      </p:sp>
-      <p:sp>
-        <p:nvSpPr>
-          <p:cNvPr id="9" name="Прямоугольник 8">
-            <a:extLst>
-              <a:ext uri="{FF2B5EF4-FFF2-40B4-BE49-F238E27FC236}">
-                <a16:creationId xmlns:a16="http://schemas.microsoft.com/office/drawing/2014/main" id="{AFD0483F-B3D3-40C4-B059-2AE2592B10BE}"/>
-              </a:ext>
-            </a:extLst>
-          </p:cNvPr>
-          <p:cNvSpPr/>
-          <p:nvPr/>
-        </p:nvSpPr>
-        <p:spPr>
-          <a:xfrm>
-            <a:off x="8933992" y="2061077"/>
-            <a:ext cx="2396971" cy="368419"/>
-          </a:xfrm>
-          <a:prstGeom prst="rect">
-            <a:avLst/>
-          </a:prstGeom>
-          <a:solidFill>
-            <a:schemeClr val="accent2">
-              <a:lumMod val="75000"/>
-            </a:schemeClr>
-          </a:solidFill>
-          <a:ln>
-            <a:solidFill>
-              <a:schemeClr val="tx1"/>
-            </a:solidFill>
-          </a:ln>
-        </p:spPr>
-        <p:style>
-          <a:lnRef idx="2">
-            <a:schemeClr val="accent1">
-              <a:shade val="50000"/>
-            </a:schemeClr>
-          </a:lnRef>
-          <a:fillRef idx="1">
-            <a:schemeClr val="accent1"/>
-          </a:fillRef>
-          <a:effectRef idx="0">
-            <a:schemeClr val="accent1"/>
-          </a:effectRef>
-          <a:fontRef idx="minor">
-            <a:schemeClr val="lt1"/>
-          </a:fontRef>
-        </p:style>
-        <p:txBody>
-          <a:bodyPr rtlCol="0" anchor="ctr"/>
-          <a:lstStyle/>
-          <a:p>
-            <a:pPr algn="ctr"/>
-            <a:r>
-              <a:rPr lang="en-US" dirty="0">
-                <a:solidFill>
-                  <a:schemeClr val="tx1"/>
-                </a:solidFill>
-              </a:rPr>
-              <a:t>0x31 </a:t>
-            </a:r>
-            <a:r>
-              <a:rPr lang="en-US" dirty="0" err="1">
-                <a:solidFill>
-                  <a:schemeClr val="tx1"/>
-                </a:solidFill>
-              </a:rPr>
-              <a:t>0x31</a:t>
-            </a:r>
-            <a:r>
-              <a:rPr lang="en-US" dirty="0">
-                <a:solidFill>
-                  <a:schemeClr val="tx1"/>
-                </a:solidFill>
-              </a:rPr>
-              <a:t> </a:t>
-            </a:r>
-            <a:r>
-              <a:rPr lang="en-US" dirty="0" err="1">
-                <a:solidFill>
-                  <a:schemeClr val="tx1"/>
-                </a:solidFill>
-              </a:rPr>
-              <a:t>0x31</a:t>
-            </a:r>
-            <a:r>
-              <a:rPr lang="en-US" dirty="0">
-                <a:solidFill>
-                  <a:schemeClr val="tx1"/>
-                </a:solidFill>
-              </a:rPr>
-              <a:t> </a:t>
-            </a:r>
-            <a:r>
-              <a:rPr lang="en-US" dirty="0" err="1">
-                <a:solidFill>
-                  <a:schemeClr val="tx1"/>
-                </a:solidFill>
-              </a:rPr>
-              <a:t>0x31</a:t>
-            </a:r>
-            <a:endParaRPr lang="en-US" dirty="0">
-              <a:solidFill>
-                <a:schemeClr val="tx1"/>
-              </a:solidFill>
-            </a:endParaRPr>
-          </a:p>
-        </p:txBody>
-      </p:sp>
-      <p:cxnSp>
-        <p:nvCxnSpPr>
-          <p:cNvPr id="10" name="Соединитель: уступ 9">
-            <a:extLst>
-              <a:ext uri="{FF2B5EF4-FFF2-40B4-BE49-F238E27FC236}">
-                <a16:creationId xmlns:a16="http://schemas.microsoft.com/office/drawing/2014/main" id="{669527EA-435B-4319-9E26-0C671C0B274D}"/>
-              </a:ext>
-            </a:extLst>
-          </p:cNvPr>
-          <p:cNvCxnSpPr>
-            <a:cxnSpLocks/>
-            <a:stCxn id="7" idx="1"/>
-          </p:cNvCxnSpPr>
-          <p:nvPr/>
-        </p:nvCxnSpPr>
-        <p:spPr>
-          <a:xfrm rot="10800000" flipH="1" flipV="1">
-            <a:off x="8933992" y="1869127"/>
-            <a:ext cx="12700" cy="2181828"/>
-          </a:xfrm>
-          <a:prstGeom prst="bentConnector4">
-            <a:avLst>
-              <a:gd name="adj1" fmla="val -1800000"/>
-              <a:gd name="adj2" fmla="val 99980"/>
-            </a:avLst>
-          </a:prstGeom>
-          <a:ln w="19050">
-            <a:solidFill>
-              <a:schemeClr val="accent2">
-                <a:lumMod val="75000"/>
-              </a:schemeClr>
-            </a:solidFill>
-            <a:tailEnd type="triangle"/>
-          </a:ln>
-        </p:spPr>
-        <p:style>
-          <a:lnRef idx="1">
-            <a:schemeClr val="accent1"/>
-          </a:lnRef>
-          <a:fillRef idx="0">
-            <a:schemeClr val="accent1"/>
-          </a:fillRef>
-          <a:effectRef idx="0">
-            <a:schemeClr val="accent1"/>
-          </a:effectRef>
-          <a:fontRef idx="minor">
-            <a:schemeClr val="tx1"/>
-          </a:fontRef>
-        </p:style>
-      </p:cxnSp>
-      <p:sp>
-        <p:nvSpPr>
-          <p:cNvPr id="11" name="Знак умножения 10">
-            <a:extLst>
-              <a:ext uri="{FF2B5EF4-FFF2-40B4-BE49-F238E27FC236}">
-                <a16:creationId xmlns:a16="http://schemas.microsoft.com/office/drawing/2014/main" id="{DEAFE425-CABE-4D81-891E-26348DDBDCF0}"/>
-              </a:ext>
-            </a:extLst>
-          </p:cNvPr>
-          <p:cNvSpPr/>
-          <p:nvPr/>
-        </p:nvSpPr>
-        <p:spPr>
-          <a:xfrm>
-            <a:off x="8375670" y="2617514"/>
-            <a:ext cx="656363" cy="405326"/>
-          </a:xfrm>
-          <a:prstGeom prst="mathMultiply">
-            <a:avLst/>
-          </a:prstGeom>
-          <a:solidFill>
-            <a:srgbClr val="FF0000"/>
-          </a:solidFill>
-        </p:spPr>
-        <p:style>
-          <a:lnRef idx="2">
-            <a:schemeClr val="accent1">
-              <a:shade val="50000"/>
-            </a:schemeClr>
-          </a:lnRef>
-          <a:fillRef idx="1">
-            <a:schemeClr val="accent1"/>
-          </a:fillRef>
-          <a:effectRef idx="0">
-            <a:schemeClr val="accent1"/>
-          </a:effectRef>
-          <a:fontRef idx="minor">
-            <a:schemeClr val="lt1"/>
-          </a:fontRef>
-        </p:style>
-        <p:txBody>
-          <a:bodyPr rtlCol="0" anchor="ctr"/>
-          <a:lstStyle/>
-          <a:p>
-            <a:pPr algn="ctr"/>
             <a:endParaRPr lang="en-US"/>
           </a:p>
         </p:txBody>
@@ -10584,7 +10584,7 @@
     </p:spTree>
     <p:extLst>
       <p:ext uri="{BB962C8B-B14F-4D97-AF65-F5344CB8AC3E}">
-        <p14:creationId xmlns:p14="http://schemas.microsoft.com/office/powerpoint/2010/main" val="2824373434"/>
+        <p14:creationId xmlns:p14="http://schemas.microsoft.com/office/powerpoint/2010/main" val="173719792"/>
       </p:ext>
     </p:extLst>
   </p:cSld>

</xml_diff>